<commit_message>
inclusão do projeto tableau
</commit_message>
<xml_diff>
--- a/assets/img/portfolio/cards-portifolio.pptx
+++ b/assets/img/portfolio/cards-portifolio.pptx
@@ -10,10 +10,11 @@
     <p:sldId id="265" r:id="rId4"/>
     <p:sldId id="266" r:id="rId5"/>
     <p:sldId id="267" r:id="rId6"/>
-    <p:sldId id="257" r:id="rId7"/>
-    <p:sldId id="258" r:id="rId8"/>
-    <p:sldId id="260" r:id="rId9"/>
-    <p:sldId id="261" r:id="rId10"/>
+    <p:sldId id="268" r:id="rId7"/>
+    <p:sldId id="257" r:id="rId8"/>
+    <p:sldId id="258" r:id="rId9"/>
+    <p:sldId id="260" r:id="rId10"/>
+    <p:sldId id="261" r:id="rId11"/>
   </p:sldIdLst>
   <p:sldSz cx="12192000" cy="6858000"/>
   <p:notesSz cx="6858000" cy="9144000"/>
@@ -693,7 +694,7 @@
           <a:p>
             <a:fld id="{28EA16E0-01DB-4CA7-B5A5-2C288B23FD35}" type="datetimeFigureOut">
               <a:rPr lang="pt-BR" smtClean="0"/>
-              <a:t>05/07/2024</a:t>
+              <a:t>05/11/2024</a:t>
             </a:fld>
             <a:endParaRPr lang="pt-BR"/>
           </a:p>
@@ -891,7 +892,7 @@
           <a:p>
             <a:fld id="{28EA16E0-01DB-4CA7-B5A5-2C288B23FD35}" type="datetimeFigureOut">
               <a:rPr lang="pt-BR" smtClean="0"/>
-              <a:t>05/07/2024</a:t>
+              <a:t>05/11/2024</a:t>
             </a:fld>
             <a:endParaRPr lang="pt-BR"/>
           </a:p>
@@ -1099,7 +1100,7 @@
           <a:p>
             <a:fld id="{28EA16E0-01DB-4CA7-B5A5-2C288B23FD35}" type="datetimeFigureOut">
               <a:rPr lang="pt-BR" smtClean="0"/>
-              <a:t>05/07/2024</a:t>
+              <a:t>05/11/2024</a:t>
             </a:fld>
             <a:endParaRPr lang="pt-BR"/>
           </a:p>
@@ -1297,7 +1298,7 @@
           <a:p>
             <a:fld id="{28EA16E0-01DB-4CA7-B5A5-2C288B23FD35}" type="datetimeFigureOut">
               <a:rPr lang="pt-BR" smtClean="0"/>
-              <a:t>05/07/2024</a:t>
+              <a:t>05/11/2024</a:t>
             </a:fld>
             <a:endParaRPr lang="pt-BR"/>
           </a:p>
@@ -1572,7 +1573,7 @@
           <a:p>
             <a:fld id="{28EA16E0-01DB-4CA7-B5A5-2C288B23FD35}" type="datetimeFigureOut">
               <a:rPr lang="pt-BR" smtClean="0"/>
-              <a:t>05/07/2024</a:t>
+              <a:t>05/11/2024</a:t>
             </a:fld>
             <a:endParaRPr lang="pt-BR"/>
           </a:p>
@@ -1837,7 +1838,7 @@
           <a:p>
             <a:fld id="{28EA16E0-01DB-4CA7-B5A5-2C288B23FD35}" type="datetimeFigureOut">
               <a:rPr lang="pt-BR" smtClean="0"/>
-              <a:t>05/07/2024</a:t>
+              <a:t>05/11/2024</a:t>
             </a:fld>
             <a:endParaRPr lang="pt-BR"/>
           </a:p>
@@ -2249,7 +2250,7 @@
           <a:p>
             <a:fld id="{28EA16E0-01DB-4CA7-B5A5-2C288B23FD35}" type="datetimeFigureOut">
               <a:rPr lang="pt-BR" smtClean="0"/>
-              <a:t>05/07/2024</a:t>
+              <a:t>05/11/2024</a:t>
             </a:fld>
             <a:endParaRPr lang="pt-BR"/>
           </a:p>
@@ -2390,7 +2391,7 @@
           <a:p>
             <a:fld id="{28EA16E0-01DB-4CA7-B5A5-2C288B23FD35}" type="datetimeFigureOut">
               <a:rPr lang="pt-BR" smtClean="0"/>
-              <a:t>05/07/2024</a:t>
+              <a:t>05/11/2024</a:t>
             </a:fld>
             <a:endParaRPr lang="pt-BR"/>
           </a:p>
@@ -2503,7 +2504,7 @@
           <a:p>
             <a:fld id="{28EA16E0-01DB-4CA7-B5A5-2C288B23FD35}" type="datetimeFigureOut">
               <a:rPr lang="pt-BR" smtClean="0"/>
-              <a:t>05/07/2024</a:t>
+              <a:t>05/11/2024</a:t>
             </a:fld>
             <a:endParaRPr lang="pt-BR"/>
           </a:p>
@@ -2814,7 +2815,7 @@
           <a:p>
             <a:fld id="{28EA16E0-01DB-4CA7-B5A5-2C288B23FD35}" type="datetimeFigureOut">
               <a:rPr lang="pt-BR" smtClean="0"/>
-              <a:t>05/07/2024</a:t>
+              <a:t>05/11/2024</a:t>
             </a:fld>
             <a:endParaRPr lang="pt-BR"/>
           </a:p>
@@ -3102,7 +3103,7 @@
           <a:p>
             <a:fld id="{28EA16E0-01DB-4CA7-B5A5-2C288B23FD35}" type="datetimeFigureOut">
               <a:rPr lang="pt-BR" smtClean="0"/>
-              <a:t>05/07/2024</a:t>
+              <a:t>05/11/2024</a:t>
             </a:fld>
             <a:endParaRPr lang="pt-BR"/>
           </a:p>
@@ -3343,7 +3344,7 @@
           <a:p>
             <a:fld id="{28EA16E0-01DB-4CA7-B5A5-2C288B23FD35}" type="datetimeFigureOut">
               <a:rPr lang="pt-BR" smtClean="0"/>
-              <a:t>05/07/2024</a:t>
+              <a:t>05/11/2024</a:t>
             </a:fld>
             <a:endParaRPr lang="pt-BR"/>
           </a:p>
@@ -3891,6 +3892,166 @@
 </p:sld>
 </file>
 
+<file path=ppt/slides/slide10.xml><?xml version="1.0" encoding="utf-8"?>
+<p:sld xmlns:a="http://schemas.openxmlformats.org/drawingml/2006/main" xmlns:r="http://schemas.openxmlformats.org/officeDocument/2006/relationships" xmlns:p="http://schemas.openxmlformats.org/presentationml/2006/main">
+  <p:cSld>
+    <p:spTree>
+      <p:nvGrpSpPr>
+        <p:cNvPr id="1" name=""/>
+        <p:cNvGrpSpPr/>
+        <p:nvPr/>
+      </p:nvGrpSpPr>
+      <p:grpSpPr>
+        <a:xfrm>
+          <a:off x="0" y="0"/>
+          <a:ext cx="0" cy="0"/>
+          <a:chOff x="0" y="0"/>
+          <a:chExt cx="0" cy="0"/>
+        </a:xfrm>
+      </p:grpSpPr>
+      <p:pic>
+        <p:nvPicPr>
+          <p:cNvPr id="3" name="Imagem 2" descr="Desenho de personagem de desenho animado&#10;&#10;Descrição gerada automaticamente com confiança baixa">
+            <a:extLst>
+              <a:ext uri="{FF2B5EF4-FFF2-40B4-BE49-F238E27FC236}">
+                <a16:creationId xmlns:a16="http://schemas.microsoft.com/office/drawing/2014/main" id="{8772FC1B-7BD9-B03C-F122-474CA62104EB}"/>
+              </a:ext>
+            </a:extLst>
+          </p:cNvPr>
+          <p:cNvPicPr>
+            <a:picLocks noChangeAspect="1"/>
+          </p:cNvPicPr>
+          <p:nvPr/>
+        </p:nvPicPr>
+        <p:blipFill>
+          <a:blip r:embed="rId2">
+            <a:extLst>
+              <a:ext uri="{28A0092B-C50C-407E-A947-70E740481C1C}">
+                <a14:useLocalDpi xmlns:a14="http://schemas.microsoft.com/office/drawing/2010/main" val="0"/>
+              </a:ext>
+            </a:extLst>
+          </a:blip>
+          <a:stretch>
+            <a:fillRect/>
+          </a:stretch>
+        </p:blipFill>
+        <p:spPr>
+          <a:xfrm>
+            <a:off x="3216000" y="311736"/>
+            <a:ext cx="5760000" cy="5760000"/>
+          </a:xfrm>
+          <a:prstGeom prst="rect">
+            <a:avLst/>
+          </a:prstGeom>
+        </p:spPr>
+      </p:pic>
+      <p:sp>
+        <p:nvSpPr>
+          <p:cNvPr id="4" name="CaixaDeTexto 3">
+            <a:extLst>
+              <a:ext uri="{FF2B5EF4-FFF2-40B4-BE49-F238E27FC236}">
+                <a16:creationId xmlns:a16="http://schemas.microsoft.com/office/drawing/2014/main" id="{A128E4B8-B652-E47C-693B-D6FE8EF4CC6E}"/>
+              </a:ext>
+            </a:extLst>
+          </p:cNvPr>
+          <p:cNvSpPr txBox="1"/>
+          <p:nvPr/>
+        </p:nvSpPr>
+        <p:spPr>
+          <a:xfrm>
+            <a:off x="0" y="128835"/>
+            <a:ext cx="12192000" cy="1015663"/>
+          </a:xfrm>
+          <a:prstGeom prst="rect">
+            <a:avLst/>
+          </a:prstGeom>
+          <a:noFill/>
+        </p:spPr>
+        <p:txBody>
+          <a:bodyPr wrap="square" rtlCol="0">
+            <a:spAutoFit/>
+          </a:bodyPr>
+          <a:lstStyle/>
+          <a:p>
+            <a:pPr algn="ctr"/>
+            <a:r>
+              <a:rPr lang="pt-BR" sz="6000" b="1" dirty="0">
+                <a:solidFill>
+                  <a:srgbClr val="0563BB"/>
+                </a:solidFill>
+                <a:latin typeface="Verdana" panose="020B0604030504040204" pitchFamily="34" charset="0"/>
+                <a:ea typeface="Verdana" panose="020B0604030504040204" pitchFamily="34" charset="0"/>
+                <a:cs typeface="Arial" panose="020B0604020202020204" pitchFamily="34" charset="0"/>
+              </a:rPr>
+              <a:t>OPERATIONAL RESEARCH</a:t>
+            </a:r>
+          </a:p>
+        </p:txBody>
+      </p:sp>
+      <p:sp>
+        <p:nvSpPr>
+          <p:cNvPr id="5" name="CaixaDeTexto 4">
+            <a:extLst>
+              <a:ext uri="{FF2B5EF4-FFF2-40B4-BE49-F238E27FC236}">
+                <a16:creationId xmlns:a16="http://schemas.microsoft.com/office/drawing/2014/main" id="{D7A7A897-B7FF-B1C9-1954-34BEAE8CD400}"/>
+              </a:ext>
+            </a:extLst>
+          </p:cNvPr>
+          <p:cNvSpPr txBox="1"/>
+          <p:nvPr/>
+        </p:nvSpPr>
+        <p:spPr>
+          <a:xfrm>
+            <a:off x="0" y="5103674"/>
+            <a:ext cx="12192000" cy="1754326"/>
+          </a:xfrm>
+          <a:prstGeom prst="rect">
+            <a:avLst/>
+          </a:prstGeom>
+          <a:noFill/>
+        </p:spPr>
+        <p:txBody>
+          <a:bodyPr wrap="square" rtlCol="0">
+            <a:spAutoFit/>
+          </a:bodyPr>
+          <a:lstStyle/>
+          <a:p>
+            <a:pPr algn="ctr"/>
+            <a:r>
+              <a:rPr lang="en-US" sz="5400" dirty="0">
+                <a:solidFill>
+                  <a:srgbClr val="0563BB"/>
+                </a:solidFill>
+                <a:latin typeface="Arial Rounded MT Bold" panose="020F0704030504030204" pitchFamily="34" charset="0"/>
+                <a:ea typeface="Verdana" panose="020B0604030504040204" pitchFamily="34" charset="0"/>
+                <a:cs typeface="Arial" panose="020B0604020202020204" pitchFamily="34" charset="0"/>
+              </a:rPr>
+              <a:t>Vehicle Routing Problem with Heterogeneous Fleet</a:t>
+            </a:r>
+            <a:endParaRPr lang="pt-BR" sz="5400" dirty="0">
+              <a:solidFill>
+                <a:srgbClr val="0563BB"/>
+              </a:solidFill>
+              <a:latin typeface="Arial Rounded MT Bold" panose="020F0704030504030204" pitchFamily="34" charset="0"/>
+              <a:ea typeface="Verdana" panose="020B0604030504040204" pitchFamily="34" charset="0"/>
+              <a:cs typeface="Arial" panose="020B0604020202020204" pitchFamily="34" charset="0"/>
+            </a:endParaRPr>
+          </a:p>
+        </p:txBody>
+      </p:sp>
+    </p:spTree>
+    <p:extLst>
+      <p:ext uri="{BB962C8B-B14F-4D97-AF65-F5344CB8AC3E}">
+        <p14:creationId xmlns:p14="http://schemas.microsoft.com/office/powerpoint/2010/main" val="3664229022"/>
+      </p:ext>
+    </p:extLst>
+  </p:cSld>
+  <p:clrMapOvr>
+    <a:masterClrMapping/>
+  </p:clrMapOvr>
+</p:sld>
+</file>
+
 <file path=ppt/slides/slide2.xml><?xml version="1.0" encoding="utf-8"?>
 <p:sld xmlns:a="http://schemas.openxmlformats.org/drawingml/2006/main" xmlns:r="http://schemas.openxmlformats.org/officeDocument/2006/relationships" xmlns:p="http://schemas.openxmlformats.org/presentationml/2006/main">
   <p:cSld>
@@ -4495,7 +4656,13 @@
   <p:cSld>
     <p:spTree>
       <p:nvGrpSpPr>
-        <p:cNvPr id="1" name=""/>
+        <p:cNvPr id="1" name="">
+          <a:extLst>
+            <a:ext uri="{FF2B5EF4-FFF2-40B4-BE49-F238E27FC236}">
+              <a16:creationId xmlns:a16="http://schemas.microsoft.com/office/drawing/2014/main" id="{3AA4625F-B733-9568-8B02-22F63F196F3B}"/>
+            </a:ext>
+          </a:extLst>
+        </p:cNvPr>
         <p:cNvGrpSpPr/>
         <p:nvPr/>
       </p:nvGrpSpPr>
@@ -4509,10 +4676,10 @@
       </p:grpSpPr>
       <p:pic>
         <p:nvPicPr>
-          <p:cNvPr id="3" name="Imagem 2" descr="Desenho de personagem de desenho animado&#10;&#10;Descrição gerada automaticamente">
-            <a:extLst>
-              <a:ext uri="{FF2B5EF4-FFF2-40B4-BE49-F238E27FC236}">
-                <a16:creationId xmlns:a16="http://schemas.microsoft.com/office/drawing/2014/main" id="{402F5158-6738-1F0E-B977-989FD4CA62AD}"/>
+          <p:cNvPr id="6" name="Imagem 5" descr="Ícone&#10;&#10;Descrição gerada automaticamente">
+            <a:extLst>
+              <a:ext uri="{FF2B5EF4-FFF2-40B4-BE49-F238E27FC236}">
+                <a16:creationId xmlns:a16="http://schemas.microsoft.com/office/drawing/2014/main" id="{78177C17-09D1-A1B5-CC0A-E5B0E3FE9D05}"/>
               </a:ext>
             </a:extLst>
           </p:cNvPr>
@@ -4535,8 +4702,8 @@
         </p:blipFill>
         <p:spPr>
           <a:xfrm>
-            <a:off x="1296000" y="729000"/>
-            <a:ext cx="9600000" cy="5400000"/>
+            <a:off x="6058171" y="8553"/>
+            <a:ext cx="6849448" cy="6849448"/>
           </a:xfrm>
           <a:prstGeom prst="rect">
             <a:avLst/>
@@ -4548,7 +4715,7 @@
           <p:cNvPr id="4" name="CaixaDeTexto 3">
             <a:extLst>
               <a:ext uri="{FF2B5EF4-FFF2-40B4-BE49-F238E27FC236}">
-                <a16:creationId xmlns:a16="http://schemas.microsoft.com/office/drawing/2014/main" id="{FFFF3812-0184-90AF-FBBB-D63A5F999143}"/>
+                <a16:creationId xmlns:a16="http://schemas.microsoft.com/office/drawing/2014/main" id="{CAF81DC6-20BA-6CF2-5D7E-AF94DC281DC0}"/>
               </a:ext>
             </a:extLst>
           </p:cNvPr>
@@ -4557,8 +4724,8 @@
         </p:nvSpPr>
         <p:spPr>
           <a:xfrm>
-            <a:off x="1228725" y="128835"/>
-            <a:ext cx="9734550" cy="1200329"/>
+            <a:off x="79512" y="769441"/>
+            <a:ext cx="6849448" cy="1938992"/>
           </a:xfrm>
           <a:prstGeom prst="rect">
             <a:avLst/>
@@ -4573,7 +4740,7 @@
           <a:p>
             <a:pPr algn="ctr"/>
             <a:r>
-              <a:rPr lang="pt-BR" sz="7200" b="1" dirty="0">
+              <a:rPr lang="pt-BR" sz="6000" b="1" dirty="0">
                 <a:solidFill>
                   <a:srgbClr val="0563BB"/>
                 </a:solidFill>
@@ -4581,7 +4748,21 @@
                 <a:ea typeface="Verdana" panose="020B0604030504040204" pitchFamily="34" charset="0"/>
                 <a:cs typeface="Arial" panose="020B0604020202020204" pitchFamily="34" charset="0"/>
               </a:rPr>
-              <a:t>CLUSTERING</a:t>
+              <a:t>STORYTELLING</a:t>
+            </a:r>
+          </a:p>
+          <a:p>
+            <a:pPr algn="ctr"/>
+            <a:r>
+              <a:rPr lang="pt-BR" sz="6000" b="1" dirty="0">
+                <a:solidFill>
+                  <a:srgbClr val="0563BB"/>
+                </a:solidFill>
+                <a:latin typeface="Verdana" panose="020B0604030504040204" pitchFamily="34" charset="0"/>
+                <a:ea typeface="Verdana" panose="020B0604030504040204" pitchFamily="34" charset="0"/>
+                <a:cs typeface="Arial" panose="020B0604020202020204" pitchFamily="34" charset="0"/>
+              </a:rPr>
+              <a:t>COM DADOS</a:t>
             </a:r>
           </a:p>
         </p:txBody>
@@ -4591,7 +4772,7 @@
           <p:cNvPr id="5" name="CaixaDeTexto 4">
             <a:extLst>
               <a:ext uri="{FF2B5EF4-FFF2-40B4-BE49-F238E27FC236}">
-                <a16:creationId xmlns:a16="http://schemas.microsoft.com/office/drawing/2014/main" id="{30730B9D-13BB-70FC-C248-D2521062A469}"/>
+                <a16:creationId xmlns:a16="http://schemas.microsoft.com/office/drawing/2014/main" id="{A449A45D-080B-31AC-19F0-7F177F52079C}"/>
               </a:ext>
             </a:extLst>
           </p:cNvPr>
@@ -4600,8 +4781,8 @@
         </p:nvSpPr>
         <p:spPr>
           <a:xfrm>
-            <a:off x="0" y="5528836"/>
-            <a:ext cx="12192000" cy="1200329"/>
+            <a:off x="79512" y="3022007"/>
+            <a:ext cx="6849448" cy="1938992"/>
           </a:xfrm>
           <a:prstGeom prst="rect">
             <a:avLst/>
@@ -4616,32 +4797,23 @@
           <a:p>
             <a:pPr algn="ctr"/>
             <a:r>
-              <a:rPr lang="pt-BR" sz="7200" dirty="0">
-                <a:solidFill>
-                  <a:srgbClr val="0563BB"/>
-                </a:solidFill>
-                <a:latin typeface="Arial Rounded MT Bold" panose="020F0704030504030204" pitchFamily="34" charset="0"/>
+              <a:rPr lang="pt-BR" sz="4000" dirty="0">
+                <a:latin typeface="Arial" panose="020B0604020202020204" pitchFamily="34" charset="0"/>
                 <a:ea typeface="Verdana" panose="020B0604030504040204" pitchFamily="34" charset="0"/>
                 <a:cs typeface="Arial" panose="020B0604020202020204" pitchFamily="34" charset="0"/>
               </a:rPr>
-              <a:t>Green Growth </a:t>
-            </a:r>
-            <a:r>
-              <a:rPr lang="pt-BR" sz="7200" dirty="0" err="1">
-                <a:solidFill>
-                  <a:srgbClr val="0563BB"/>
-                </a:solidFill>
-                <a:latin typeface="Arial Rounded MT Bold" panose="020F0704030504030204" pitchFamily="34" charset="0"/>
+              <a:t>Análise de terremotos registrados de 1973 a 2013 com Tableau </a:t>
+            </a:r>
+            <a:r>
+              <a:rPr lang="pt-BR" sz="4000" dirty="0" err="1">
+                <a:latin typeface="Arial" panose="020B0604020202020204" pitchFamily="34" charset="0"/>
                 <a:ea typeface="Verdana" panose="020B0604030504040204" pitchFamily="34" charset="0"/>
                 <a:cs typeface="Arial" panose="020B0604020202020204" pitchFamily="34" charset="0"/>
               </a:rPr>
-              <a:t>indicators</a:t>
-            </a:r>
-            <a:endParaRPr lang="pt-BR" sz="7200" dirty="0">
-              <a:solidFill>
-                <a:srgbClr val="0563BB"/>
-              </a:solidFill>
-              <a:latin typeface="Arial Rounded MT Bold" panose="020F0704030504030204" pitchFamily="34" charset="0"/>
+              <a:t>Public</a:t>
+            </a:r>
+            <a:endParaRPr lang="en-US" sz="4000" dirty="0">
+              <a:latin typeface="Arial" panose="020B0604020202020204" pitchFamily="34" charset="0"/>
               <a:ea typeface="Verdana" panose="020B0604030504040204" pitchFamily="34" charset="0"/>
               <a:cs typeface="Arial" panose="020B0604020202020204" pitchFamily="34" charset="0"/>
             </a:endParaRPr>
@@ -4651,7 +4823,7 @@
     </p:spTree>
     <p:extLst>
       <p:ext uri="{BB962C8B-B14F-4D97-AF65-F5344CB8AC3E}">
-        <p14:creationId xmlns:p14="http://schemas.microsoft.com/office/powerpoint/2010/main" val="3094583086"/>
+        <p14:creationId xmlns:p14="http://schemas.microsoft.com/office/powerpoint/2010/main" val="2343711022"/>
       </p:ext>
     </p:extLst>
   </p:cSld>
@@ -4680,10 +4852,10 @@
       </p:grpSpPr>
       <p:pic>
         <p:nvPicPr>
-          <p:cNvPr id="3" name="Imagem 2" descr="Desenho de personagem de desenho animado&#10;&#10;Descrição gerada automaticamente com confiança média">
-            <a:extLst>
-              <a:ext uri="{FF2B5EF4-FFF2-40B4-BE49-F238E27FC236}">
-                <a16:creationId xmlns:a16="http://schemas.microsoft.com/office/drawing/2014/main" id="{ECED02C7-09C0-EC2B-32B4-D81577CB83E3}"/>
+          <p:cNvPr id="3" name="Imagem 2" descr="Desenho de personagem de desenho animado&#10;&#10;Descrição gerada automaticamente">
+            <a:extLst>
+              <a:ext uri="{FF2B5EF4-FFF2-40B4-BE49-F238E27FC236}">
+                <a16:creationId xmlns:a16="http://schemas.microsoft.com/office/drawing/2014/main" id="{402F5158-6738-1F0E-B977-989FD4CA62AD}"/>
               </a:ext>
             </a:extLst>
           </p:cNvPr>
@@ -4706,8 +4878,8 @@
         </p:blipFill>
         <p:spPr>
           <a:xfrm>
-            <a:off x="656000" y="369000"/>
-            <a:ext cx="10880000" cy="6120000"/>
+            <a:off x="1296000" y="729000"/>
+            <a:ext cx="9600000" cy="5400000"/>
           </a:xfrm>
           <a:prstGeom prst="rect">
             <a:avLst/>
@@ -4719,7 +4891,7 @@
           <p:cNvPr id="4" name="CaixaDeTexto 3">
             <a:extLst>
               <a:ext uri="{FF2B5EF4-FFF2-40B4-BE49-F238E27FC236}">
-                <a16:creationId xmlns:a16="http://schemas.microsoft.com/office/drawing/2014/main" id="{05580C2E-9A88-0CED-A559-C28FFD25F071}"/>
+                <a16:creationId xmlns:a16="http://schemas.microsoft.com/office/drawing/2014/main" id="{FFFF3812-0184-90AF-FBBB-D63A5F999143}"/>
               </a:ext>
             </a:extLst>
           </p:cNvPr>
@@ -4752,7 +4924,7 @@
                 <a:ea typeface="Verdana" panose="020B0604030504040204" pitchFamily="34" charset="0"/>
                 <a:cs typeface="Arial" panose="020B0604020202020204" pitchFamily="34" charset="0"/>
               </a:rPr>
-              <a:t>TIME SERIES</a:t>
+              <a:t>CLUSTERING</a:t>
             </a:r>
           </a:p>
         </p:txBody>
@@ -4762,7 +4934,7 @@
           <p:cNvPr id="5" name="CaixaDeTexto 4">
             <a:extLst>
               <a:ext uri="{FF2B5EF4-FFF2-40B4-BE49-F238E27FC236}">
-                <a16:creationId xmlns:a16="http://schemas.microsoft.com/office/drawing/2014/main" id="{77196CD6-8C17-EC1F-2FB6-6D3CF0DE30D3}"/>
+                <a16:creationId xmlns:a16="http://schemas.microsoft.com/office/drawing/2014/main" id="{30730B9D-13BB-70FC-C248-D2521062A469}"/>
               </a:ext>
             </a:extLst>
           </p:cNvPr>
@@ -4795,15 +4967,34 @@
                 <a:ea typeface="Verdana" panose="020B0604030504040204" pitchFamily="34" charset="0"/>
                 <a:cs typeface="Arial" panose="020B0604020202020204" pitchFamily="34" charset="0"/>
               </a:rPr>
-              <a:t>COVID-19 in São Paulo</a:t>
-            </a:r>
+              <a:t>Green Growth </a:t>
+            </a:r>
+            <a:r>
+              <a:rPr lang="pt-BR" sz="7200" dirty="0" err="1">
+                <a:solidFill>
+                  <a:srgbClr val="0563BB"/>
+                </a:solidFill>
+                <a:latin typeface="Arial Rounded MT Bold" panose="020F0704030504030204" pitchFamily="34" charset="0"/>
+                <a:ea typeface="Verdana" panose="020B0604030504040204" pitchFamily="34" charset="0"/>
+                <a:cs typeface="Arial" panose="020B0604020202020204" pitchFamily="34" charset="0"/>
+              </a:rPr>
+              <a:t>indicators</a:t>
+            </a:r>
+            <a:endParaRPr lang="pt-BR" sz="7200" dirty="0">
+              <a:solidFill>
+                <a:srgbClr val="0563BB"/>
+              </a:solidFill>
+              <a:latin typeface="Arial Rounded MT Bold" panose="020F0704030504030204" pitchFamily="34" charset="0"/>
+              <a:ea typeface="Verdana" panose="020B0604030504040204" pitchFamily="34" charset="0"/>
+              <a:cs typeface="Arial" panose="020B0604020202020204" pitchFamily="34" charset="0"/>
+            </a:endParaRPr>
           </a:p>
         </p:txBody>
       </p:sp>
     </p:spTree>
     <p:extLst>
       <p:ext uri="{BB962C8B-B14F-4D97-AF65-F5344CB8AC3E}">
-        <p14:creationId xmlns:p14="http://schemas.microsoft.com/office/powerpoint/2010/main" val="314579243"/>
+        <p14:creationId xmlns:p14="http://schemas.microsoft.com/office/powerpoint/2010/main" val="3094583086"/>
       </p:ext>
     </p:extLst>
   </p:cSld>
@@ -4832,10 +5023,10 @@
       </p:grpSpPr>
       <p:pic>
         <p:nvPicPr>
-          <p:cNvPr id="6" name="Imagem 5" descr="Desenho de personagem de desenho animado&#10;&#10;Descrição gerada automaticamente">
-            <a:extLst>
-              <a:ext uri="{FF2B5EF4-FFF2-40B4-BE49-F238E27FC236}">
-                <a16:creationId xmlns:a16="http://schemas.microsoft.com/office/drawing/2014/main" id="{AD13CDD3-5CCC-25BC-9973-2096604D28E7}"/>
+          <p:cNvPr id="3" name="Imagem 2" descr="Desenho de personagem de desenho animado&#10;&#10;Descrição gerada automaticamente com confiança média">
+            <a:extLst>
+              <a:ext uri="{FF2B5EF4-FFF2-40B4-BE49-F238E27FC236}">
+                <a16:creationId xmlns:a16="http://schemas.microsoft.com/office/drawing/2014/main" id="{ECED02C7-09C0-EC2B-32B4-D81577CB83E3}"/>
               </a:ext>
             </a:extLst>
           </p:cNvPr>
@@ -4858,8 +5049,8 @@
         </p:blipFill>
         <p:spPr>
           <a:xfrm>
-            <a:off x="3036000" y="369000"/>
-            <a:ext cx="6120000" cy="6120000"/>
+            <a:off x="656000" y="369000"/>
+            <a:ext cx="10880000" cy="6120000"/>
           </a:xfrm>
           <a:prstGeom prst="rect">
             <a:avLst/>
@@ -4880,8 +5071,8 @@
         </p:nvSpPr>
         <p:spPr>
           <a:xfrm>
-            <a:off x="0" y="128835"/>
-            <a:ext cx="12192000" cy="1200329"/>
+            <a:off x="1228725" y="128835"/>
+            <a:ext cx="9734550" cy="1200329"/>
           </a:xfrm>
           <a:prstGeom prst="rect">
             <a:avLst/>
@@ -4904,7 +5095,7 @@
                 <a:ea typeface="Verdana" panose="020B0604030504040204" pitchFamily="34" charset="0"/>
                 <a:cs typeface="Arial" panose="020B0604020202020204" pitchFamily="34" charset="0"/>
               </a:rPr>
-              <a:t>ANOMALY DETECTION</a:t>
+              <a:t>TIME SERIES</a:t>
             </a:r>
           </a:p>
         </p:txBody>
@@ -4939,17 +5130,6 @@
           <a:p>
             <a:pPr algn="ctr"/>
             <a:r>
-              <a:rPr lang="pt-BR" sz="7200" dirty="0" err="1">
-                <a:solidFill>
-                  <a:srgbClr val="0563BB"/>
-                </a:solidFill>
-                <a:latin typeface="Arial Rounded MT Bold" panose="020F0704030504030204" pitchFamily="34" charset="0"/>
-                <a:ea typeface="Verdana" panose="020B0604030504040204" pitchFamily="34" charset="0"/>
-                <a:cs typeface="Arial" panose="020B0604020202020204" pitchFamily="34" charset="0"/>
-              </a:rPr>
-              <a:t>Frauds</a:t>
-            </a:r>
-            <a:r>
               <a:rPr lang="pt-BR" sz="7200" dirty="0">
                 <a:solidFill>
                   <a:srgbClr val="0563BB"/>
@@ -4958,29 +5138,7 @@
                 <a:ea typeface="Verdana" panose="020B0604030504040204" pitchFamily="34" charset="0"/>
                 <a:cs typeface="Arial" panose="020B0604020202020204" pitchFamily="34" charset="0"/>
               </a:rPr>
-              <a:t> in </a:t>
-            </a:r>
-            <a:r>
-              <a:rPr lang="pt-BR" sz="7200" dirty="0" err="1">
-                <a:solidFill>
-                  <a:srgbClr val="0563BB"/>
-                </a:solidFill>
-                <a:latin typeface="Arial Rounded MT Bold" panose="020F0704030504030204" pitchFamily="34" charset="0"/>
-                <a:ea typeface="Verdana" panose="020B0604030504040204" pitchFamily="34" charset="0"/>
-                <a:cs typeface="Arial" panose="020B0604020202020204" pitchFamily="34" charset="0"/>
-              </a:rPr>
-              <a:t>an</a:t>
-            </a:r>
-            <a:r>
-              <a:rPr lang="pt-BR" sz="7200" dirty="0">
-                <a:solidFill>
-                  <a:srgbClr val="0563BB"/>
-                </a:solidFill>
-                <a:latin typeface="Arial Rounded MT Bold" panose="020F0704030504030204" pitchFamily="34" charset="0"/>
-                <a:ea typeface="Verdana" panose="020B0604030504040204" pitchFamily="34" charset="0"/>
-                <a:cs typeface="Arial" panose="020B0604020202020204" pitchFamily="34" charset="0"/>
-              </a:rPr>
-              <a:t> E-commerce</a:t>
+              <a:t>COVID-19 in São Paulo</a:t>
             </a:r>
           </a:p>
         </p:txBody>
@@ -4988,7 +5146,7 @@
     </p:spTree>
     <p:extLst>
       <p:ext uri="{BB962C8B-B14F-4D97-AF65-F5344CB8AC3E}">
-        <p14:creationId xmlns:p14="http://schemas.microsoft.com/office/powerpoint/2010/main" val="1330256755"/>
+        <p14:creationId xmlns:p14="http://schemas.microsoft.com/office/powerpoint/2010/main" val="314579243"/>
       </p:ext>
     </p:extLst>
   </p:cSld>
@@ -5017,10 +5175,10 @@
       </p:grpSpPr>
       <p:pic>
         <p:nvPicPr>
-          <p:cNvPr id="3" name="Imagem 2" descr="Desenho de personagem de desenho animado&#10;&#10;Descrição gerada automaticamente com confiança baixa">
-            <a:extLst>
-              <a:ext uri="{FF2B5EF4-FFF2-40B4-BE49-F238E27FC236}">
-                <a16:creationId xmlns:a16="http://schemas.microsoft.com/office/drawing/2014/main" id="{8772FC1B-7BD9-B03C-F122-474CA62104EB}"/>
+          <p:cNvPr id="6" name="Imagem 5" descr="Desenho de personagem de desenho animado&#10;&#10;Descrição gerada automaticamente">
+            <a:extLst>
+              <a:ext uri="{FF2B5EF4-FFF2-40B4-BE49-F238E27FC236}">
+                <a16:creationId xmlns:a16="http://schemas.microsoft.com/office/drawing/2014/main" id="{AD13CDD3-5CCC-25BC-9973-2096604D28E7}"/>
               </a:ext>
             </a:extLst>
           </p:cNvPr>
@@ -5043,8 +5201,8 @@
         </p:blipFill>
         <p:spPr>
           <a:xfrm>
-            <a:off x="3216000" y="311736"/>
-            <a:ext cx="5760000" cy="5760000"/>
+            <a:off x="3036000" y="369000"/>
+            <a:ext cx="6120000" cy="6120000"/>
           </a:xfrm>
           <a:prstGeom prst="rect">
             <a:avLst/>
@@ -5056,7 +5214,7 @@
           <p:cNvPr id="4" name="CaixaDeTexto 3">
             <a:extLst>
               <a:ext uri="{FF2B5EF4-FFF2-40B4-BE49-F238E27FC236}">
-                <a16:creationId xmlns:a16="http://schemas.microsoft.com/office/drawing/2014/main" id="{A128E4B8-B652-E47C-693B-D6FE8EF4CC6E}"/>
+                <a16:creationId xmlns:a16="http://schemas.microsoft.com/office/drawing/2014/main" id="{05580C2E-9A88-0CED-A559-C28FFD25F071}"/>
               </a:ext>
             </a:extLst>
           </p:cNvPr>
@@ -5066,7 +5224,7 @@
         <p:spPr>
           <a:xfrm>
             <a:off x="0" y="128835"/>
-            <a:ext cx="12192000" cy="1015663"/>
+            <a:ext cx="12192000" cy="1200329"/>
           </a:xfrm>
           <a:prstGeom prst="rect">
             <a:avLst/>
@@ -5081,7 +5239,7 @@
           <a:p>
             <a:pPr algn="ctr"/>
             <a:r>
-              <a:rPr lang="pt-BR" sz="6000" b="1" dirty="0">
+              <a:rPr lang="pt-BR" sz="7200" b="1" dirty="0">
                 <a:solidFill>
                   <a:srgbClr val="0563BB"/>
                 </a:solidFill>
@@ -5089,7 +5247,7 @@
                 <a:ea typeface="Verdana" panose="020B0604030504040204" pitchFamily="34" charset="0"/>
                 <a:cs typeface="Arial" panose="020B0604020202020204" pitchFamily="34" charset="0"/>
               </a:rPr>
-              <a:t>OPERATIONAL RESEARCH</a:t>
+              <a:t>ANOMALY DETECTION</a:t>
             </a:r>
           </a:p>
         </p:txBody>
@@ -5099,7 +5257,7 @@
           <p:cNvPr id="5" name="CaixaDeTexto 4">
             <a:extLst>
               <a:ext uri="{FF2B5EF4-FFF2-40B4-BE49-F238E27FC236}">
-                <a16:creationId xmlns:a16="http://schemas.microsoft.com/office/drawing/2014/main" id="{D7A7A897-B7FF-B1C9-1954-34BEAE8CD400}"/>
+                <a16:creationId xmlns:a16="http://schemas.microsoft.com/office/drawing/2014/main" id="{77196CD6-8C17-EC1F-2FB6-6D3CF0DE30D3}"/>
               </a:ext>
             </a:extLst>
           </p:cNvPr>
@@ -5108,8 +5266,8 @@
         </p:nvSpPr>
         <p:spPr>
           <a:xfrm>
-            <a:off x="0" y="5103674"/>
-            <a:ext cx="12192000" cy="1754326"/>
+            <a:off x="0" y="5528836"/>
+            <a:ext cx="12192000" cy="1200329"/>
           </a:xfrm>
           <a:prstGeom prst="rect">
             <a:avLst/>
@@ -5124,7 +5282,7 @@
           <a:p>
             <a:pPr algn="ctr"/>
             <a:r>
-              <a:rPr lang="en-US" sz="5400" dirty="0">
+              <a:rPr lang="pt-BR" sz="7200" dirty="0" err="1">
                 <a:solidFill>
                   <a:srgbClr val="0563BB"/>
                 </a:solidFill>
@@ -5132,23 +5290,48 @@
                 <a:ea typeface="Verdana" panose="020B0604030504040204" pitchFamily="34" charset="0"/>
                 <a:cs typeface="Arial" panose="020B0604020202020204" pitchFamily="34" charset="0"/>
               </a:rPr>
-              <a:t>Vehicle Routing Problem with Heterogeneous Fleet</a:t>
-            </a:r>
-            <a:endParaRPr lang="pt-BR" sz="5400" dirty="0">
-              <a:solidFill>
-                <a:srgbClr val="0563BB"/>
-              </a:solidFill>
-              <a:latin typeface="Arial Rounded MT Bold" panose="020F0704030504030204" pitchFamily="34" charset="0"/>
-              <a:ea typeface="Verdana" panose="020B0604030504040204" pitchFamily="34" charset="0"/>
-              <a:cs typeface="Arial" panose="020B0604020202020204" pitchFamily="34" charset="0"/>
-            </a:endParaRPr>
+              <a:t>Frauds</a:t>
+            </a:r>
+            <a:r>
+              <a:rPr lang="pt-BR" sz="7200" dirty="0">
+                <a:solidFill>
+                  <a:srgbClr val="0563BB"/>
+                </a:solidFill>
+                <a:latin typeface="Arial Rounded MT Bold" panose="020F0704030504030204" pitchFamily="34" charset="0"/>
+                <a:ea typeface="Verdana" panose="020B0604030504040204" pitchFamily="34" charset="0"/>
+                <a:cs typeface="Arial" panose="020B0604020202020204" pitchFamily="34" charset="0"/>
+              </a:rPr>
+              <a:t> in </a:t>
+            </a:r>
+            <a:r>
+              <a:rPr lang="pt-BR" sz="7200" dirty="0" err="1">
+                <a:solidFill>
+                  <a:srgbClr val="0563BB"/>
+                </a:solidFill>
+                <a:latin typeface="Arial Rounded MT Bold" panose="020F0704030504030204" pitchFamily="34" charset="0"/>
+                <a:ea typeface="Verdana" panose="020B0604030504040204" pitchFamily="34" charset="0"/>
+                <a:cs typeface="Arial" panose="020B0604020202020204" pitchFamily="34" charset="0"/>
+              </a:rPr>
+              <a:t>an</a:t>
+            </a:r>
+            <a:r>
+              <a:rPr lang="pt-BR" sz="7200" dirty="0">
+                <a:solidFill>
+                  <a:srgbClr val="0563BB"/>
+                </a:solidFill>
+                <a:latin typeface="Arial Rounded MT Bold" panose="020F0704030504030204" pitchFamily="34" charset="0"/>
+                <a:ea typeface="Verdana" panose="020B0604030504040204" pitchFamily="34" charset="0"/>
+                <a:cs typeface="Arial" panose="020B0604020202020204" pitchFamily="34" charset="0"/>
+              </a:rPr>
+              <a:t> E-commerce</a:t>
+            </a:r>
           </a:p>
         </p:txBody>
       </p:sp>
     </p:spTree>
     <p:extLst>
       <p:ext uri="{BB962C8B-B14F-4D97-AF65-F5344CB8AC3E}">
-        <p14:creationId xmlns:p14="http://schemas.microsoft.com/office/powerpoint/2010/main" val="3664229022"/>
+        <p14:creationId xmlns:p14="http://schemas.microsoft.com/office/powerpoint/2010/main" val="1330256755"/>
       </p:ext>
     </p:extLst>
   </p:cSld>

</xml_diff>